<commit_message>
Updated Demo 2 Slides
</commit_message>
<xml_diff>
--- a/MOCUIPlugin-Demo2.pptx
+++ b/MOCUIPlugin-Demo2.pptx
@@ -5,7 +5,7 @@
     <p:sldMasterId id="2147483648" r:id="rId2"/>
   </p:sldMasterIdLst>
   <p:notesMasterIdLst>
-    <p:notesMasterId r:id="rId12"/>
+    <p:notesMasterId r:id="rId13"/>
   </p:notesMasterIdLst>
   <p:sldIdLst>
     <p:sldId id="256" r:id="rId3"/>
@@ -13,10 +13,11 @@
     <p:sldId id="275" r:id="rId5"/>
     <p:sldId id="267" r:id="rId6"/>
     <p:sldId id="270" r:id="rId7"/>
-    <p:sldId id="272" r:id="rId8"/>
+    <p:sldId id="279" r:id="rId8"/>
     <p:sldId id="278" r:id="rId9"/>
     <p:sldId id="271" r:id="rId10"/>
-    <p:sldId id="265" r:id="rId11"/>
+    <p:sldId id="280" r:id="rId11"/>
+    <p:sldId id="265" r:id="rId12"/>
   </p:sldIdLst>
   <p:sldSz cx="9144000" cy="5143500" type="screen16x9"/>
   <p:notesSz cx="6858000" cy="9144000"/>
@@ -115,7 +116,7 @@
   </p:defaultTextStyle>
   <p:extLst>
     <p:ext uri="{EFAFB233-063F-42B5-8137-9DF3F51BA10A}">
-      <p15:sldGuideLst xmlns="" xmlns:p15="http://schemas.microsoft.com/office/powerpoint/2012/main">
+      <p15:sldGuideLst xmlns:p15="http://schemas.microsoft.com/office/powerpoint/2012/main" xmlns="">
         <p15:guide id="1" orient="horz" pos="1620">
           <p15:clr>
             <a:srgbClr val="A4A3A4"/>
@@ -4305,6 +4306,71 @@
 </p:sld>
 </file>
 
+<file path=ppt/slides/slide10.xml><?xml version="1.0" encoding="utf-8"?>
+<p:sld xmlns:a="http://schemas.openxmlformats.org/drawingml/2006/main" xmlns:r="http://schemas.openxmlformats.org/officeDocument/2006/relationships" xmlns:p="http://schemas.openxmlformats.org/presentationml/2006/main">
+  <p:cSld>
+    <p:spTree>
+      <p:nvGrpSpPr>
+        <p:cNvPr id="1" name=""/>
+        <p:cNvGrpSpPr/>
+        <p:nvPr/>
+      </p:nvGrpSpPr>
+      <p:grpSpPr>
+        <a:xfrm>
+          <a:off x="0" y="0"/>
+          <a:ext cx="0" cy="0"/>
+          <a:chOff x="0" y="0"/>
+          <a:chExt cx="0" cy="0"/>
+        </a:xfrm>
+      </p:grpSpPr>
+      <p:sp>
+        <p:nvSpPr>
+          <p:cNvPr id="5" name="Title 4"/>
+          <p:cNvSpPr>
+            <a:spLocks noGrp="1"/>
+          </p:cNvSpPr>
+          <p:nvPr>
+            <p:ph type="title"/>
+          </p:nvPr>
+        </p:nvSpPr>
+        <p:spPr>
+          <a:xfrm>
+            <a:off x="2286000" y="2438400"/>
+            <a:ext cx="6477000" cy="2038350"/>
+          </a:xfrm>
+        </p:spPr>
+        <p:txBody>
+          <a:bodyPr/>
+          <a:lstStyle/>
+          <a:p>
+            <a:r>
+              <a:rPr lang="en-US" dirty="0" smtClean="0"/>
+              <a:t>Q &amp; A!</a:t>
+            </a:r>
+            <a:endParaRPr lang="en-US" dirty="0"/>
+          </a:p>
+        </p:txBody>
+      </p:sp>
+    </p:spTree>
+    <p:extLst>
+      <p:ext uri="{BB962C8B-B14F-4D97-AF65-F5344CB8AC3E}">
+        <p14:creationId xmlns:p14="http://schemas.microsoft.com/office/powerpoint/2010/main" val="1511644209"/>
+      </p:ext>
+    </p:extLst>
+  </p:cSld>
+  <p:clrMapOvr>
+    <a:masterClrMapping/>
+  </p:clrMapOvr>
+  <p:timing>
+    <p:tnLst>
+      <p:par>
+        <p:cTn id="1" dur="indefinite" restart="never" nodeType="tmRoot"/>
+      </p:par>
+    </p:tnLst>
+  </p:timing>
+</p:sld>
+</file>
+
 <file path=ppt/slides/slide2.xml><?xml version="1.0" encoding="utf-8"?>
 <p:sld xmlns:a="http://schemas.openxmlformats.org/drawingml/2006/main" xmlns:r="http://schemas.openxmlformats.org/officeDocument/2006/relationships" xmlns:p="http://schemas.openxmlformats.org/presentationml/2006/main">
   <p:cSld>
@@ -4535,7 +4601,7 @@
         </p:nvSpPr>
         <p:spPr>
           <a:xfrm>
-            <a:off x="1905000" y="2571750"/>
+            <a:off x="1752600" y="2571750"/>
             <a:ext cx="2971800" cy="1752600"/>
           </a:xfrm>
           <a:prstGeom prst="rect">
@@ -4621,8 +4687,8 @@
         </p:nvCxnSpPr>
         <p:spPr>
           <a:xfrm>
-            <a:off x="3886200" y="3028950"/>
-            <a:ext cx="2895600" cy="76200"/>
+            <a:off x="3962400" y="3105150"/>
+            <a:ext cx="2819400" cy="0"/>
           </a:xfrm>
           <a:prstGeom prst="straightConnector1">
             <a:avLst/>
@@ -4653,9 +4719,9 @@
           <p:nvPr/>
         </p:nvCxnSpPr>
         <p:spPr>
-          <a:xfrm flipH="1" flipV="1">
-            <a:off x="3962400" y="3333750"/>
-            <a:ext cx="2819400" cy="152400"/>
+          <a:xfrm flipH="1">
+            <a:off x="3962400" y="3486150"/>
+            <a:ext cx="2819400" cy="0"/>
           </a:xfrm>
           <a:prstGeom prst="straightConnector1">
             <a:avLst/>
@@ -5104,7 +5170,6 @@
               <a:rPr lang="en-US" dirty="0" smtClean="0"/>
               <a:t>)</a:t>
             </a:r>
-            <a:endParaRPr lang="en-US" dirty="0" smtClean="0"/>
           </a:p>
           <a:p>
             <a:r>
@@ -5119,7 +5184,6 @@
               <a:rPr lang="en-US" dirty="0" smtClean="0"/>
               <a:t> API</a:t>
             </a:r>
-            <a:endParaRPr lang="en-US" dirty="0" smtClean="0"/>
           </a:p>
           <a:p>
             <a:r>
@@ -5132,7 +5196,6 @@
               <a:rPr lang="en-US" dirty="0" smtClean="0"/>
               <a:t>Did not use Trello</a:t>
             </a:r>
-            <a:endParaRPr lang="en-US" dirty="0" smtClean="0"/>
           </a:p>
           <a:p>
             <a:pPr lvl="1"/>
@@ -5237,7 +5300,7 @@
         <p:spPr/>
         <p:txBody>
           <a:bodyPr>
-            <a:normAutofit/>
+            <a:normAutofit lnSpcReduction="10000"/>
           </a:bodyPr>
           <a:lstStyle/>
           <a:p>
@@ -5280,23 +5343,7 @@
                   <a:prstClr val="black"/>
                 </a:solidFill>
               </a:rPr>
-              <a:t> </a:t>
-            </a:r>
-            <a:r>
-              <a:rPr lang="en-US" dirty="0" smtClean="0">
-                <a:solidFill>
-                  <a:prstClr val="black"/>
-                </a:solidFill>
-              </a:rPr>
-              <a:t>server </a:t>
-            </a:r>
-            <a:r>
-              <a:rPr lang="en-US" dirty="0" smtClean="0">
-                <a:solidFill>
-                  <a:prstClr val="black"/>
-                </a:solidFill>
-              </a:rPr>
-              <a:t>[3]</a:t>
+              <a:t> server [3]</a:t>
             </a:r>
             <a:endParaRPr lang="en-US" dirty="0" smtClean="0"/>
           </a:p>
@@ -5331,7 +5378,6 @@
               <a:rPr lang="en-US" dirty="0" smtClean="0"/>
               <a:t>]</a:t>
             </a:r>
-            <a:endParaRPr lang="en-US" dirty="0" smtClean="0"/>
           </a:p>
           <a:p>
             <a:r>
@@ -5374,6 +5420,25 @@
               </a:rPr>
               <a:t>]</a:t>
             </a:r>
+          </a:p>
+          <a:p>
+            <a:r>
+              <a:rPr lang="en-US" dirty="0"/>
+              <a:t>Stretch – added API call to </a:t>
+            </a:r>
+            <a:r>
+              <a:rPr lang="en-US" dirty="0" err="1"/>
+              <a:t>HaaS</a:t>
+            </a:r>
+            <a:r>
+              <a:rPr lang="en-US" dirty="0"/>
+              <a:t> </a:t>
+            </a:r>
+            <a:endParaRPr lang="en-US" dirty="0" smtClean="0">
+              <a:solidFill>
+                <a:prstClr val="black"/>
+              </a:solidFill>
+            </a:endParaRPr>
           </a:p>
           <a:p>
             <a:pPr marL="365760" lvl="1" indent="0">
@@ -5422,7 +5487,7 @@
       </p:grpSpPr>
       <p:sp>
         <p:nvSpPr>
-          <p:cNvPr id="21" name="Title 20"/>
+          <p:cNvPr id="2" name="Title 1"/>
           <p:cNvSpPr>
             <a:spLocks noGrp="1"/>
           </p:cNvSpPr>
@@ -5436,130 +5501,12 @@
           <a:lstStyle/>
           <a:p>
             <a:r>
-              <a:rPr lang="en-US" smtClean="0"/>
-              <a:t>Sprint 2 </a:t>
-            </a:r>
-            <a:r>
-              <a:rPr lang="en-US" dirty="0" smtClean="0"/>
-              <a:t>– Cont’d</a:t>
-            </a:r>
-            <a:endParaRPr lang="en-US" dirty="0"/>
-          </a:p>
-        </p:txBody>
-      </p:sp>
-      <p:sp>
-        <p:nvSpPr>
-          <p:cNvPr id="2" name="Content Placeholder 1"/>
-          <p:cNvSpPr>
-            <a:spLocks noGrp="1"/>
-          </p:cNvSpPr>
-          <p:nvPr>
-            <p:ph sz="quarter" idx="13"/>
-          </p:nvPr>
-        </p:nvSpPr>
-        <p:spPr/>
-        <p:txBody>
-          <a:bodyPr/>
-          <a:lstStyle/>
-          <a:p>
-            <a:r>
-              <a:rPr lang="en-US" dirty="0"/>
-              <a:t>Stretch – added API call to </a:t>
-            </a:r>
-            <a:r>
-              <a:rPr lang="en-US" dirty="0" err="1"/>
-              <a:t>HaaS</a:t>
-            </a:r>
-            <a:r>
-              <a:rPr lang="en-US" dirty="0"/>
-              <a:t> </a:t>
-            </a:r>
-          </a:p>
-          <a:p>
-            <a:r>
-              <a:rPr lang="en-US" dirty="0" smtClean="0">
-                <a:hlinkClick r:id="rId2"/>
-              </a:rPr>
-              <a:t>Http</a:t>
-            </a:r>
-            <a:r>
-              <a:rPr lang="en-US" dirty="0">
-                <a:hlinkClick r:id="rId2"/>
-              </a:rPr>
-              <a:t>://</a:t>
-            </a:r>
-            <a:r>
-              <a:rPr lang="en-US" dirty="0" smtClean="0">
-                <a:hlinkClick r:id="rId2"/>
-              </a:rPr>
-              <a:t>192.168.32.133:8000</a:t>
-            </a:r>
-            <a:r>
-              <a:rPr lang="en-US" dirty="0" smtClean="0"/>
-              <a:t> [DEMO]</a:t>
-            </a:r>
-          </a:p>
-        </p:txBody>
-      </p:sp>
-    </p:spTree>
-    <p:extLst>
-      <p:ext uri="{BB962C8B-B14F-4D97-AF65-F5344CB8AC3E}">
-        <p14:creationId xmlns:p14="http://schemas.microsoft.com/office/powerpoint/2010/main" val="2243242566"/>
-      </p:ext>
-    </p:extLst>
-  </p:cSld>
-  <p:clrMapOvr>
-    <a:masterClrMapping/>
-  </p:clrMapOvr>
-  <p:timing>
-    <p:tnLst>
-      <p:par>
-        <p:cTn id="1" dur="indefinite" restart="never" nodeType="tmRoot"/>
-      </p:par>
-    </p:tnLst>
-  </p:timing>
-</p:sld>
-</file>
-
-<file path=ppt/slides/slide7.xml><?xml version="1.0" encoding="utf-8"?>
-<p:sld xmlns:a="http://schemas.openxmlformats.org/drawingml/2006/main" xmlns:r="http://schemas.openxmlformats.org/officeDocument/2006/relationships" xmlns:p="http://schemas.openxmlformats.org/presentationml/2006/main">
-  <p:cSld>
-    <p:spTree>
-      <p:nvGrpSpPr>
-        <p:cNvPr id="1" name=""/>
-        <p:cNvGrpSpPr/>
-        <p:nvPr/>
-      </p:nvGrpSpPr>
-      <p:grpSpPr>
-        <a:xfrm>
-          <a:off x="0" y="0"/>
-          <a:ext cx="0" cy="0"/>
-          <a:chOff x="0" y="0"/>
-          <a:chExt cx="0" cy="0"/>
-        </a:xfrm>
-      </p:grpSpPr>
-      <p:sp>
-        <p:nvSpPr>
-          <p:cNvPr id="2" name="Title 1"/>
-          <p:cNvSpPr>
-            <a:spLocks noGrp="1"/>
-          </p:cNvSpPr>
-          <p:nvPr>
-            <p:ph type="title"/>
-          </p:nvPr>
-        </p:nvSpPr>
-        <p:spPr/>
-        <p:txBody>
-          <a:bodyPr/>
-          <a:lstStyle/>
-          <a:p>
-            <a:r>
               <a:rPr lang="en-US" dirty="0" err="1" smtClean="0"/>
               <a:t>Burndown</a:t>
             </a:r>
             <a:r>
               <a:rPr lang="en-US" dirty="0" smtClean="0"/>
-              <a:t> (and our mistakes!)</a:t>
+              <a:t> – Bad Chart</a:t>
             </a:r>
             <a:endParaRPr lang="en-US" dirty="0"/>
           </a:p>
@@ -5567,11 +5514,13 @@
       </p:sp>
       <p:pic>
         <p:nvPicPr>
-          <p:cNvPr id="1026" name="Picture 2"/>
+          <p:cNvPr id="4" name="Picture 2"/>
           <p:cNvPicPr>
-            <a:picLocks noChangeAspect="1" noChangeArrowheads="1"/>
+            <a:picLocks noGrp="1" noChangeAspect="1" noChangeArrowheads="1"/>
           </p:cNvPicPr>
-          <p:nvPr/>
+          <p:nvPr>
+            <p:ph sz="quarter" idx="13"/>
+          </p:nvPr>
         </p:nvPicPr>
         <p:blipFill rotWithShape="1">
           <a:blip r:embed="rId2">
@@ -5581,13 +5530,13 @@
               </a:ext>
             </a:extLst>
           </a:blip>
-          <a:srcRect l="34511" t="22847" r="16390" b="26671"/>
+          <a:srcRect l="34511" t="22388" r="16571" b="27910"/>
           <a:stretch/>
         </p:blipFill>
         <p:spPr bwMode="auto">
           <a:xfrm>
-            <a:off x="228600" y="1809750"/>
-            <a:ext cx="4419600" cy="2591350"/>
+            <a:off x="1828800" y="1387098"/>
+            <a:ext cx="5644522" cy="3226095"/>
           </a:xfrm>
           <a:prstGeom prst="rect">
             <a:avLst/>
@@ -5617,6 +5566,63 @@
           </a:extLst>
         </p:spPr>
       </p:pic>
+    </p:spTree>
+    <p:extLst>
+      <p:ext uri="{BB962C8B-B14F-4D97-AF65-F5344CB8AC3E}">
+        <p14:creationId xmlns:p14="http://schemas.microsoft.com/office/powerpoint/2010/main" val="1189769892"/>
+      </p:ext>
+    </p:extLst>
+  </p:cSld>
+  <p:clrMapOvr>
+    <a:masterClrMapping/>
+  </p:clrMapOvr>
+</p:sld>
+</file>
+
+<file path=ppt/slides/slide7.xml><?xml version="1.0" encoding="utf-8"?>
+<p:sld xmlns:a="http://schemas.openxmlformats.org/drawingml/2006/main" xmlns:r="http://schemas.openxmlformats.org/officeDocument/2006/relationships" xmlns:p="http://schemas.openxmlformats.org/presentationml/2006/main">
+  <p:cSld>
+    <p:spTree>
+      <p:nvGrpSpPr>
+        <p:cNvPr id="1" name=""/>
+        <p:cNvGrpSpPr/>
+        <p:nvPr/>
+      </p:nvGrpSpPr>
+      <p:grpSpPr>
+        <a:xfrm>
+          <a:off x="0" y="0"/>
+          <a:ext cx="0" cy="0"/>
+          <a:chOff x="0" y="0"/>
+          <a:chExt cx="0" cy="0"/>
+        </a:xfrm>
+      </p:grpSpPr>
+      <p:sp>
+        <p:nvSpPr>
+          <p:cNvPr id="2" name="Title 1"/>
+          <p:cNvSpPr>
+            <a:spLocks noGrp="1"/>
+          </p:cNvSpPr>
+          <p:nvPr>
+            <p:ph type="title"/>
+          </p:nvPr>
+        </p:nvSpPr>
+        <p:spPr/>
+        <p:txBody>
+          <a:bodyPr/>
+          <a:lstStyle/>
+          <a:p>
+            <a:r>
+              <a:rPr lang="en-US" dirty="0" err="1" smtClean="0"/>
+              <a:t>Burndown</a:t>
+            </a:r>
+            <a:r>
+              <a:rPr lang="en-US" dirty="0" smtClean="0"/>
+              <a:t> – Corrected </a:t>
+            </a:r>
+            <a:endParaRPr lang="en-US" dirty="0"/>
+          </a:p>
+        </p:txBody>
+      </p:sp>
       <p:pic>
         <p:nvPicPr>
           <p:cNvPr id="1027" name="Picture 3"/>
@@ -5628,20 +5634,20 @@
           </p:nvPr>
         </p:nvPicPr>
         <p:blipFill rotWithShape="1">
-          <a:blip r:embed="rId3">
+          <a:blip r:embed="rId2">
             <a:extLst>
               <a:ext uri="{28A0092B-C50C-407E-A947-70E740481C1C}">
                 <a14:useLocalDpi xmlns:a14="http://schemas.microsoft.com/office/drawing/2010/main" val="0"/>
               </a:ext>
             </a:extLst>
           </a:blip>
-          <a:srcRect l="33937" t="21157" r="16842" b="19955"/>
+          <a:srcRect l="34345" t="22256" r="16842" b="27944"/>
           <a:stretch/>
         </p:blipFill>
         <p:spPr bwMode="auto">
           <a:xfrm>
-            <a:off x="4419600" y="1790700"/>
-            <a:ext cx="4343400" cy="2819400"/>
+            <a:off x="1645920" y="1495586"/>
+            <a:ext cx="5471572" cy="3028628"/>
           </a:xfrm>
           <a:prstGeom prst="rect">
             <a:avLst/>
@@ -5750,30 +5756,29 @@
           <a:p>
             <a:r>
               <a:rPr lang="en-US" dirty="0" smtClean="0"/>
-              <a:t>(15) </a:t>
+              <a:t>(</a:t>
+            </a:r>
+            <a:r>
+              <a:rPr lang="en-US" dirty="0"/>
+              <a:t>?</a:t>
             </a:r>
             <a:r>
               <a:rPr lang="en-US" dirty="0" smtClean="0"/>
-              <a:t>Complete </a:t>
-            </a:r>
-            <a:r>
-              <a:rPr lang="en-US" dirty="0" err="1" smtClean="0"/>
-              <a:t>HaaS</a:t>
+              <a:t>) Integrate </a:t>
             </a:r>
             <a:r>
               <a:rPr lang="en-US" dirty="0" smtClean="0"/>
-              <a:t> API</a:t>
-            </a:r>
-            <a:endParaRPr lang="en-US" dirty="0" smtClean="0"/>
-          </a:p>
-          <a:p>
+              <a:t>API </a:t>
+            </a:r>
             <a:r>
               <a:rPr lang="en-US" dirty="0" smtClean="0"/>
-              <a:t>(15) </a:t>
-            </a:r>
+              <a:t>calls</a:t>
+            </a:r>
+          </a:p>
+          <a:p>
             <a:r>
               <a:rPr lang="en-US" dirty="0" smtClean="0"/>
-              <a:t>Integrate API calls</a:t>
+              <a:t>(?)Complete Submission Forms</a:t>
             </a:r>
             <a:endParaRPr lang="en-US" dirty="0" smtClean="0"/>
           </a:p>
@@ -5818,7 +5823,7 @@
       </p:grpSpPr>
       <p:sp>
         <p:nvSpPr>
-          <p:cNvPr id="5" name="Title 4"/>
+          <p:cNvPr id="2" name="Title 1"/>
           <p:cNvSpPr>
             <a:spLocks noGrp="1"/>
           </p:cNvSpPr>
@@ -5826,41 +5831,86 @@
             <p:ph type="title"/>
           </p:nvPr>
         </p:nvSpPr>
-        <p:spPr>
-          <a:xfrm>
-            <a:off x="2286000" y="2438400"/>
-            <a:ext cx="6477000" cy="2038350"/>
-          </a:xfrm>
-        </p:spPr>
+        <p:spPr/>
         <p:txBody>
           <a:bodyPr/>
           <a:lstStyle/>
           <a:p>
             <a:r>
               <a:rPr lang="en-US" dirty="0" smtClean="0"/>
-              <a:t>Q &amp; A!</a:t>
+              <a:t>Overall Status</a:t>
             </a:r>
             <a:endParaRPr lang="en-US" dirty="0"/>
+          </a:p>
+        </p:txBody>
+      </p:sp>
+      <p:sp>
+        <p:nvSpPr>
+          <p:cNvPr id="3" name="Content Placeholder 2"/>
+          <p:cNvSpPr>
+            <a:spLocks noGrp="1"/>
+          </p:cNvSpPr>
+          <p:nvPr>
+            <p:ph sz="quarter" idx="13"/>
+          </p:nvPr>
+        </p:nvSpPr>
+        <p:spPr/>
+        <p:txBody>
+          <a:bodyPr/>
+          <a:lstStyle/>
+          <a:p>
+            <a:r>
+              <a:rPr lang="en-US" dirty="0" smtClean="0"/>
+              <a:t>Almost done with initial goals</a:t>
+            </a:r>
+          </a:p>
+          <a:p>
+            <a:r>
+              <a:rPr lang="en-US" dirty="0" err="1" smtClean="0"/>
+              <a:t>iFrame</a:t>
+            </a:r>
+            <a:r>
+              <a:rPr lang="en-US" dirty="0" smtClean="0"/>
+              <a:t> Integration (Sprint 4 &amp; 5)</a:t>
+            </a:r>
+          </a:p>
+          <a:p>
+            <a:pPr lvl="1"/>
+            <a:r>
+              <a:rPr lang="en-US" dirty="0" smtClean="0"/>
+              <a:t>Depends on MOC UI group</a:t>
+            </a:r>
+          </a:p>
+          <a:p>
+            <a:r>
+              <a:rPr lang="en-US" dirty="0" smtClean="0"/>
+              <a:t>Could work on stretch goals in the meantime</a:t>
+            </a:r>
+          </a:p>
+          <a:p>
+            <a:pPr lvl="1"/>
+            <a:r>
+              <a:rPr lang="en-US" dirty="0" smtClean="0"/>
+              <a:t>Authorization for </a:t>
+            </a:r>
+            <a:r>
+              <a:rPr lang="en-US" dirty="0" err="1" smtClean="0"/>
+              <a:t>HaaS</a:t>
+            </a:r>
+            <a:endParaRPr lang="en-US" dirty="0" smtClean="0"/>
           </a:p>
         </p:txBody>
       </p:sp>
     </p:spTree>
     <p:extLst>
       <p:ext uri="{BB962C8B-B14F-4D97-AF65-F5344CB8AC3E}">
-        <p14:creationId xmlns:p14="http://schemas.microsoft.com/office/powerpoint/2010/main" val="1511644209"/>
+        <p14:creationId xmlns:p14="http://schemas.microsoft.com/office/powerpoint/2010/main" val="1349926020"/>
       </p:ext>
     </p:extLst>
   </p:cSld>
   <p:clrMapOvr>
     <a:masterClrMapping/>
   </p:clrMapOvr>
-  <p:timing>
-    <p:tnLst>
-      <p:par>
-        <p:cTn id="1" dur="indefinite" restart="never" nodeType="tmRoot"/>
-      </p:par>
-    </p:tnLst>
-  </p:timing>
 </p:sld>
 </file>
 

</xml_diff>

<commit_message>
diagram + other changes
</commit_message>
<xml_diff>
--- a/MOCUIPlugin-Demo2.pptx
+++ b/MOCUIPlugin-Demo2.pptx
@@ -218,7 +218,7 @@
             <a:fld id="{A8ADFD5B-A66C-449C-B6E8-FB716D07777D}" type="datetimeFigureOut">
               <a:rPr lang="en-US" smtClean="0"/>
               <a:pPr/>
-              <a:t>3/25/2015</a:t>
+              <a:t>3/25/15</a:t>
             </a:fld>
             <a:endParaRPr lang="en-US"/>
           </a:p>
@@ -858,7 +858,7 @@
                 </a:solidFill>
               </a:rPr>
               <a:pPr algn="ctr"/>
-              <a:t>3/25/2015</a:t>
+              <a:t>3/25/15</a:t>
             </a:fld>
             <a:endParaRPr kumimoji="0" lang="en-US" sz="2000" dirty="0">
               <a:solidFill>
@@ -1057,7 +1057,7 @@
             <a:fld id="{E4606EA6-EFEA-4C30-9264-4F9291A5780D}" type="datetime1">
               <a:rPr kumimoji="0" lang="en-US" smtClean="0"/>
               <a:pPr/>
-              <a:t>3/25/2015</a:t>
+              <a:t>3/25/15</a:t>
             </a:fld>
             <a:endParaRPr kumimoji="0" lang="en-US"/>
           </a:p>
@@ -1488,7 +1488,7 @@
             <a:fld id="{6FCF9F07-3BC7-4570-B054-79111B0A380C}" type="datetime1">
               <a:rPr kumimoji="0" lang="en-US" smtClean="0"/>
               <a:pPr/>
-              <a:t>3/25/2015</a:t>
+              <a:t>3/25/15</a:t>
             </a:fld>
             <a:endParaRPr kumimoji="0" lang="en-US"/>
           </a:p>
@@ -1753,7 +1753,7 @@
             <a:fld id="{E4606EA6-EFEA-4C30-9264-4F9291A5780D}" type="datetime1">
               <a:rPr kumimoji="0" lang="en-US" smtClean="0"/>
               <a:pPr/>
-              <a:t>3/25/2015</a:t>
+              <a:t>3/25/15</a:t>
             </a:fld>
             <a:endParaRPr kumimoji="0" lang="en-US"/>
           </a:p>
@@ -2008,7 +2008,7 @@
             <a:fld id="{E4606EA6-EFEA-4C30-9264-4F9291A5780D}" type="datetime1">
               <a:rPr kumimoji="0" lang="en-US" smtClean="0"/>
               <a:pPr/>
-              <a:t>3/25/2015</a:t>
+              <a:t>3/25/15</a:t>
             </a:fld>
             <a:endParaRPr kumimoji="0" lang="en-US"/>
           </a:p>
@@ -2221,7 +2221,7 @@
             <a:fld id="{6DFADB5D-B7A0-47E3-AD2D-B1A6F8614213}" type="datetime1">
               <a:rPr kumimoji="0" lang="en-US" smtClean="0"/>
               <a:pPr/>
-              <a:t>3/25/2015</a:t>
+              <a:t>3/25/15</a:t>
             </a:fld>
             <a:endParaRPr kumimoji="0" lang="en-US"/>
           </a:p>
@@ -2334,7 +2334,7 @@
             <a:fld id="{72968126-03FC-49C0-B9B8-2B561CCC3D90}" type="datetime1">
               <a:rPr kumimoji="0" lang="en-US" smtClean="0"/>
               <a:pPr/>
-              <a:t>3/25/2015</a:t>
+              <a:t>3/25/15</a:t>
             </a:fld>
             <a:endParaRPr kumimoji="0" lang="en-US"/>
           </a:p>
@@ -2487,7 +2487,7 @@
             <a:fld id="{F49A8198-4617-485E-9585-4840B69DBBA6}" type="datetime1">
               <a:rPr kumimoji="0" lang="en-US" smtClean="0"/>
               <a:pPr/>
-              <a:t>3/25/2015</a:t>
+              <a:t>3/25/15</a:t>
             </a:fld>
             <a:endParaRPr kumimoji="0" lang="en-US"/>
           </a:p>
@@ -3076,7 +3076,7 @@
             <a:fld id="{E4606EA6-EFEA-4C30-9264-4F9291A5780D}" type="datetime1">
               <a:rPr kumimoji="0" lang="en-US" smtClean="0"/>
               <a:pPr/>
-              <a:t>3/25/2015</a:t>
+              <a:t>3/25/15</a:t>
             </a:fld>
             <a:endParaRPr kumimoji="0" lang="en-US"/>
           </a:p>
@@ -3276,7 +3276,7 @@
             <a:fld id="{E4606EA6-EFEA-4C30-9264-4F9291A5780D}" type="datetime1">
               <a:rPr kumimoji="0" lang="en-US" smtClean="0"/>
               <a:pPr/>
-              <a:t>3/25/2015</a:t>
+              <a:t>3/25/15</a:t>
             </a:fld>
             <a:endParaRPr kumimoji="0" lang="en-US" sz="1400" dirty="0">
               <a:solidFill>
@@ -4065,8 +4065,12 @@
               </a:rPr>
             </a:br>
             <a:r>
+              <a:rPr lang="en-US" sz="1200" dirty="0" smtClean="0"/>
+              <a:t>Jonathan </a:t>
+            </a:r>
+            <a:r>
               <a:rPr lang="en-US" sz="1200" dirty="0"/>
-              <a:t>Jon Bell</a:t>
+              <a:t>Bell</a:t>
             </a:r>
             <a:r>
               <a:rPr lang="en-US" sz="1050" b="1" dirty="0">
@@ -4299,7 +4303,7 @@
   <p:timing>
     <p:tnLst>
       <p:par>
-        <p:cTn id="1" dur="indefinite" restart="never" nodeType="tmRoot"/>
+        <p:cTn xmlns:p14="http://schemas.microsoft.com/office/powerpoint/2010/main" id="1" dur="indefinite" restart="never" nodeType="tmRoot"/>
       </p:par>
     </p:tnLst>
   </p:timing>
@@ -4364,7 +4368,7 @@
   <p:timing>
     <p:tnLst>
       <p:par>
-        <p:cTn id="1" dur="indefinite" restart="never" nodeType="tmRoot"/>
+        <p:cTn xmlns:p14="http://schemas.microsoft.com/office/powerpoint/2010/main" id="1" dur="indefinite" restart="never" nodeType="tmRoot"/>
       </p:par>
     </p:tnLst>
   </p:timing>
@@ -4454,10 +4458,9 @@
           </a:p>
           <a:p>
             <a:r>
-              <a:rPr lang="en-US" dirty="0" err="1" smtClean="0"/>
+              <a:rPr lang="en-US" dirty="0" smtClean="0"/>
               <a:t>HaaS</a:t>
             </a:r>
-            <a:endParaRPr lang="en-US" dirty="0" smtClean="0"/>
           </a:p>
           <a:p>
             <a:pPr lvl="1"/>
@@ -4470,23 +4473,14 @@
               <a:t>case: implement a web app to manage projects using </a:t>
             </a:r>
             <a:r>
-              <a:rPr lang="en-US" dirty="0" err="1" smtClean="0"/>
+              <a:rPr lang="en-US" dirty="0" smtClean="0"/>
               <a:t>HaaS</a:t>
             </a:r>
-            <a:endParaRPr lang="en-US" dirty="0" smtClean="0"/>
           </a:p>
           <a:p>
             <a:r>
               <a:rPr lang="en-US" dirty="0" smtClean="0"/>
-              <a:t>Integration of </a:t>
-            </a:r>
-            <a:r>
-              <a:rPr lang="en-US" dirty="0" err="1" smtClean="0"/>
-              <a:t>HaaS</a:t>
-            </a:r>
-            <a:r>
-              <a:rPr lang="en-US" dirty="0" smtClean="0"/>
-              <a:t> app into MOC-UI</a:t>
+              <a:t>Integration of HaaS app into MOC-UI</a:t>
             </a:r>
             <a:endParaRPr lang="en-US" dirty="0"/>
           </a:p>
@@ -4505,7 +4499,7 @@
   <p:timing>
     <p:tnLst>
       <p:par>
-        <p:cTn id="1" dur="indefinite" restart="never" nodeType="tmRoot"/>
+        <p:cTn xmlns:p14="http://schemas.microsoft.com/office/powerpoint/2010/main" id="1" dur="indefinite" restart="never" nodeType="tmRoot"/>
       </p:par>
     </p:tnLst>
   </p:timing>
@@ -4546,7 +4540,7 @@
           <a:p>
             <a:r>
               <a:rPr lang="en-US" dirty="0" smtClean="0"/>
-              <a:t>Integration Strategy (use diagrams)</a:t>
+              <a:t>Integration Strategy</a:t>
             </a:r>
             <a:endParaRPr lang="en-US" dirty="0"/>
           </a:p>
@@ -4560,7 +4554,7 @@
         </p:nvSpPr>
         <p:spPr>
           <a:xfrm>
-            <a:off x="1066800" y="1962150"/>
+            <a:off x="762000" y="1962150"/>
             <a:ext cx="4343400" cy="2590800"/>
           </a:xfrm>
           <a:prstGeom prst="rect">
@@ -4601,8 +4595,8 @@
         </p:nvSpPr>
         <p:spPr>
           <a:xfrm>
-            <a:off x="1752600" y="2571750"/>
-            <a:ext cx="2971800" cy="1752600"/>
+            <a:off x="2057400" y="3028950"/>
+            <a:ext cx="1905000" cy="609600"/>
           </a:xfrm>
           <a:prstGeom prst="rect">
             <a:avLst/>
@@ -4635,7 +4629,11 @@
           <a:lstStyle/>
           <a:p>
             <a:pPr algn="ctr"/>
-            <a:endParaRPr lang="en-US"/>
+            <a:r>
+              <a:rPr lang="en-US" dirty="0" smtClean="0"/>
+              <a:t>iFrame</a:t>
+            </a:r>
+            <a:endParaRPr lang="en-US" dirty="0"/>
           </a:p>
         </p:txBody>
       </p:sp>
@@ -4688,7 +4686,7 @@
         <p:spPr>
           <a:xfrm>
             <a:off x="3962400" y="3105150"/>
-            <a:ext cx="2819400" cy="0"/>
+            <a:ext cx="2590800" cy="0"/>
           </a:xfrm>
           <a:prstGeom prst="straightConnector1">
             <a:avLst/>
@@ -4721,7 +4719,7 @@
         <p:spPr>
           <a:xfrm flipH="1">
             <a:off x="3962400" y="3486150"/>
-            <a:ext cx="2819400" cy="0"/>
+            <a:ext cx="2514600" cy="0"/>
           </a:xfrm>
           <a:prstGeom prst="straightConnector1">
             <a:avLst/>
@@ -4778,20 +4776,56 @@
           </a:fontRef>
         </p:style>
       </p:cxnSp>
-      <p:sp>
-        <p:nvSpPr>
-          <p:cNvPr id="12" name="Flowchart: Magnetic Disk 11"/>
+      <p:cxnSp>
+        <p:nvCxnSpPr>
+          <p:cNvPr id="15" name="Straight Arrow Connector 14"/>
+          <p:cNvCxnSpPr>
+            <a:stCxn id="6" idx="3"/>
+          </p:cNvCxnSpPr>
+          <p:nvPr/>
+        </p:nvCxnSpPr>
+        <p:spPr>
+          <a:xfrm flipH="1">
+            <a:off x="7848600" y="2114550"/>
+            <a:ext cx="485775" cy="457200"/>
+          </a:xfrm>
+          <a:prstGeom prst="straightConnector1">
+            <a:avLst/>
+          </a:prstGeom>
+          <a:ln>
+            <a:tailEnd type="arrow"/>
+          </a:ln>
+        </p:spPr>
+        <p:style>
+          <a:lnRef idx="1">
+            <a:schemeClr val="accent1"/>
+          </a:lnRef>
+          <a:fillRef idx="0">
+            <a:schemeClr val="accent1"/>
+          </a:fillRef>
+          <a:effectRef idx="0">
+            <a:schemeClr val="accent1"/>
+          </a:effectRef>
+          <a:fontRef idx="minor">
+            <a:schemeClr val="tx1"/>
+          </a:fontRef>
+        </p:style>
+      </p:cxnSp>
+      <p:sp>
+        <p:nvSpPr>
+          <p:cNvPr id="16" name="Rectangle 15"/>
           <p:cNvSpPr/>
           <p:nvPr/>
         </p:nvSpPr>
         <p:spPr>
           <a:xfrm>
-            <a:off x="8077200" y="1581150"/>
-            <a:ext cx="457200" cy="685800"/>
-          </a:xfrm>
-          <a:prstGeom prst="flowChartMagneticDisk">
+            <a:off x="762000" y="1962150"/>
+            <a:ext cx="4343400" cy="609600"/>
+          </a:xfrm>
+          <a:prstGeom prst="rect">
             <a:avLst/>
           </a:prstGeom>
+          <a:noFill/>
         </p:spPr>
         <p:style>
           <a:lnRef idx="2">
@@ -4814,71 +4848,45 @@
           <a:lstStyle/>
           <a:p>
             <a:pPr algn="ctr"/>
-            <a:endParaRPr lang="en-US"/>
-          </a:p>
-        </p:txBody>
-      </p:sp>
-      <p:cxnSp>
-        <p:nvCxnSpPr>
-          <p:cNvPr id="15" name="Straight Arrow Connector 14"/>
-          <p:cNvCxnSpPr>
-            <a:stCxn id="12" idx="3"/>
-          </p:cNvCxnSpPr>
+            <a:r>
+              <a:rPr lang="en-US" b="1" dirty="0" smtClean="0">
+                <a:solidFill>
+                  <a:schemeClr val="tx1"/>
+                </a:solidFill>
+              </a:rPr>
+              <a:t>MOC-UI</a:t>
+            </a:r>
+            <a:endParaRPr lang="en-US" b="1" dirty="0">
+              <a:solidFill>
+                <a:schemeClr val="tx1"/>
+              </a:solidFill>
+            </a:endParaRPr>
+          </a:p>
+        </p:txBody>
+      </p:sp>
+      <p:sp>
+        <p:nvSpPr>
+          <p:cNvPr id="6" name="Cube 5"/>
+          <p:cNvSpPr/>
           <p:nvPr/>
-        </p:nvCxnSpPr>
-        <p:spPr>
-          <a:xfrm flipH="1">
-            <a:off x="7848600" y="2266950"/>
-            <a:ext cx="457200" cy="304800"/>
-          </a:xfrm>
-          <a:prstGeom prst="straightConnector1">
+        </p:nvSpPr>
+        <p:spPr>
+          <a:xfrm>
+            <a:off x="8077200" y="1428750"/>
+            <a:ext cx="685800" cy="685800"/>
+          </a:xfrm>
+          <a:prstGeom prst="cube">
             <a:avLst/>
           </a:prstGeom>
-          <a:ln>
-            <a:tailEnd type="arrow"/>
-          </a:ln>
         </p:spPr>
         <p:style>
           <a:lnRef idx="1">
             <a:schemeClr val="accent1"/>
           </a:lnRef>
-          <a:fillRef idx="0">
+          <a:fillRef idx="3">
             <a:schemeClr val="accent1"/>
           </a:fillRef>
-          <a:effectRef idx="0">
-            <a:schemeClr val="accent1"/>
-          </a:effectRef>
-          <a:fontRef idx="minor">
-            <a:schemeClr val="tx1"/>
-          </a:fontRef>
-        </p:style>
-      </p:cxnSp>
-      <p:sp>
-        <p:nvSpPr>
-          <p:cNvPr id="16" name="Rectangle 15"/>
-          <p:cNvSpPr/>
-          <p:nvPr/>
-        </p:nvSpPr>
-        <p:spPr>
-          <a:xfrm>
-            <a:off x="1066800" y="1962150"/>
-            <a:ext cx="4343400" cy="609600"/>
-          </a:xfrm>
-          <a:prstGeom prst="rect">
-            <a:avLst/>
-          </a:prstGeom>
-          <a:noFill/>
-        </p:spPr>
-        <p:style>
-          <a:lnRef idx="2">
-            <a:schemeClr val="accent1">
-              <a:shade val="50000"/>
-            </a:schemeClr>
-          </a:lnRef>
-          <a:fillRef idx="1">
-            <a:schemeClr val="accent1"/>
-          </a:fillRef>
-          <a:effectRef idx="0">
+          <a:effectRef idx="2">
             <a:schemeClr val="accent1"/>
           </a:effectRef>
           <a:fontRef idx="minor">
@@ -4890,19 +4898,262 @@
           <a:lstStyle/>
           <a:p>
             <a:pPr algn="ctr"/>
-            <a:r>
-              <a:rPr lang="en-US" b="1" dirty="0" smtClean="0">
-                <a:solidFill>
-                  <a:schemeClr val="tx1"/>
-                </a:solidFill>
-              </a:rPr>
-              <a:t>MOC-UI</a:t>
-            </a:r>
-            <a:endParaRPr lang="en-US" b="1" dirty="0">
-              <a:solidFill>
-                <a:schemeClr val="tx1"/>
-              </a:solidFill>
-            </a:endParaRPr>
+            <a:endParaRPr lang="en-US"/>
+          </a:p>
+        </p:txBody>
+      </p:sp>
+      <p:sp>
+        <p:nvSpPr>
+          <p:cNvPr id="13" name="TextBox 12"/>
+          <p:cNvSpPr txBox="1"/>
+          <p:nvPr/>
+        </p:nvSpPr>
+        <p:spPr>
+          <a:xfrm>
+            <a:off x="1295400" y="2571750"/>
+            <a:ext cx="1295400" cy="369332"/>
+          </a:xfrm>
+          <a:prstGeom prst="rect">
+            <a:avLst/>
+          </a:prstGeom>
+          <a:noFill/>
+        </p:spPr>
+        <p:txBody>
+          <a:bodyPr wrap="square" rtlCol="0">
+            <a:spAutoFit/>
+          </a:bodyPr>
+          <a:lstStyle/>
+          <a:p>
+            <a:r>
+              <a:rPr lang="en-US" dirty="0" smtClean="0"/>
+              <a:t>&lt;Header&gt;</a:t>
+            </a:r>
+            <a:endParaRPr lang="en-US" dirty="0"/>
+          </a:p>
+        </p:txBody>
+      </p:sp>
+      <p:sp>
+        <p:nvSpPr>
+          <p:cNvPr id="14" name="TextBox 13"/>
+          <p:cNvSpPr txBox="1"/>
+          <p:nvPr/>
+        </p:nvSpPr>
+        <p:spPr>
+          <a:xfrm>
+            <a:off x="1295400" y="3714750"/>
+            <a:ext cx="1143000" cy="369332"/>
+          </a:xfrm>
+          <a:prstGeom prst="rect">
+            <a:avLst/>
+          </a:prstGeom>
+          <a:noFill/>
+        </p:spPr>
+        <p:txBody>
+          <a:bodyPr wrap="square" rtlCol="0">
+            <a:spAutoFit/>
+          </a:bodyPr>
+          <a:lstStyle/>
+          <a:p>
+            <a:r>
+              <a:rPr lang="en-US" dirty="0" smtClean="0"/>
+              <a:t>&lt;Footer&gt;</a:t>
+            </a:r>
+            <a:endParaRPr lang="en-US" dirty="0"/>
+          </a:p>
+        </p:txBody>
+      </p:sp>
+      <p:sp>
+        <p:nvSpPr>
+          <p:cNvPr id="17" name="TextBox 16"/>
+          <p:cNvSpPr txBox="1"/>
+          <p:nvPr/>
+        </p:nvSpPr>
+        <p:spPr>
+          <a:xfrm>
+            <a:off x="6781800" y="1352550"/>
+            <a:ext cx="1364476" cy="369332"/>
+          </a:xfrm>
+          <a:prstGeom prst="rect">
+            <a:avLst/>
+          </a:prstGeom>
+          <a:noFill/>
+        </p:spPr>
+        <p:txBody>
+          <a:bodyPr wrap="none" rtlCol="0">
+            <a:spAutoFit/>
+          </a:bodyPr>
+          <a:lstStyle/>
+          <a:p>
+            <a:r>
+              <a:rPr lang="en-US" dirty="0" smtClean="0"/>
+              <a:t>HaaS Server</a:t>
+            </a:r>
+            <a:endParaRPr lang="en-US" dirty="0"/>
+          </a:p>
+        </p:txBody>
+      </p:sp>
+      <p:sp>
+        <p:nvSpPr>
+          <p:cNvPr id="18" name="TextBox 17"/>
+          <p:cNvSpPr txBox="1"/>
+          <p:nvPr/>
+        </p:nvSpPr>
+        <p:spPr>
+          <a:xfrm>
+            <a:off x="6934200" y="4095750"/>
+            <a:ext cx="1507669" cy="369332"/>
+          </a:xfrm>
+          <a:prstGeom prst="rect">
+            <a:avLst/>
+          </a:prstGeom>
+          <a:noFill/>
+        </p:spPr>
+        <p:txBody>
+          <a:bodyPr wrap="none" rtlCol="0">
+            <a:spAutoFit/>
+          </a:bodyPr>
+          <a:lstStyle/>
+          <a:p>
+            <a:r>
+              <a:rPr lang="en-US" dirty="0" smtClean="0"/>
+              <a:t>HaaS Services</a:t>
+            </a:r>
+            <a:endParaRPr lang="en-US" dirty="0"/>
+          </a:p>
+        </p:txBody>
+      </p:sp>
+      <p:sp>
+        <p:nvSpPr>
+          <p:cNvPr id="19" name="TextBox 18"/>
+          <p:cNvSpPr txBox="1"/>
+          <p:nvPr/>
+        </p:nvSpPr>
+        <p:spPr>
+          <a:xfrm>
+            <a:off x="5410200" y="3409950"/>
+            <a:ext cx="838200" cy="646331"/>
+          </a:xfrm>
+          <a:prstGeom prst="rect">
+            <a:avLst/>
+          </a:prstGeom>
+          <a:noFill/>
+        </p:spPr>
+        <p:txBody>
+          <a:bodyPr wrap="square" rtlCol="0">
+            <a:spAutoFit/>
+          </a:bodyPr>
+          <a:lstStyle/>
+          <a:p>
+            <a:r>
+              <a:rPr lang="en-US" dirty="0" smtClean="0"/>
+              <a:t>Name, URL</a:t>
+            </a:r>
+            <a:endParaRPr lang="en-US" dirty="0"/>
+          </a:p>
+        </p:txBody>
+      </p:sp>
+      <p:sp>
+        <p:nvSpPr>
+          <p:cNvPr id="20" name="TextBox 19"/>
+          <p:cNvSpPr txBox="1"/>
+          <p:nvPr/>
+        </p:nvSpPr>
+        <p:spPr>
+          <a:xfrm>
+            <a:off x="5410200" y="2495550"/>
+            <a:ext cx="1153869" cy="646331"/>
+          </a:xfrm>
+          <a:prstGeom prst="rect">
+            <a:avLst/>
+          </a:prstGeom>
+          <a:noFill/>
+        </p:spPr>
+        <p:txBody>
+          <a:bodyPr wrap="none" rtlCol="0">
+            <a:spAutoFit/>
+          </a:bodyPr>
+          <a:lstStyle/>
+          <a:p>
+            <a:r>
+              <a:rPr lang="en-US" dirty="0" smtClean="0"/>
+              <a:t>Add to list</a:t>
+            </a:r>
+          </a:p>
+          <a:p>
+            <a:r>
+              <a:rPr lang="en-US" dirty="0" smtClean="0"/>
+              <a:t>&lt;Market&gt;</a:t>
+            </a:r>
+            <a:endParaRPr lang="en-US" dirty="0"/>
+          </a:p>
+        </p:txBody>
+      </p:sp>
+      <p:sp>
+        <p:nvSpPr>
+          <p:cNvPr id="21" name="Rectangle 20"/>
+          <p:cNvSpPr/>
+          <p:nvPr/>
+        </p:nvSpPr>
+        <p:spPr>
+          <a:xfrm>
+            <a:off x="6553200" y="1352550"/>
+            <a:ext cx="2362200" cy="3276600"/>
+          </a:xfrm>
+          <a:prstGeom prst="rect">
+            <a:avLst/>
+          </a:prstGeom>
+          <a:noFill/>
+        </p:spPr>
+        <p:style>
+          <a:lnRef idx="1">
+            <a:schemeClr val="accent1"/>
+          </a:lnRef>
+          <a:fillRef idx="3">
+            <a:schemeClr val="accent1"/>
+          </a:fillRef>
+          <a:effectRef idx="2">
+            <a:schemeClr val="accent1"/>
+          </a:effectRef>
+          <a:fontRef idx="minor">
+            <a:schemeClr val="lt1"/>
+          </a:fontRef>
+        </p:style>
+        <p:txBody>
+          <a:bodyPr rtlCol="0" anchor="ctr"/>
+          <a:lstStyle/>
+          <a:p>
+            <a:pPr algn="ctr"/>
+            <a:endParaRPr lang="en-US"/>
+          </a:p>
+        </p:txBody>
+      </p:sp>
+      <p:sp>
+        <p:nvSpPr>
+          <p:cNvPr id="28" name="TextBox 27"/>
+          <p:cNvSpPr txBox="1"/>
+          <p:nvPr/>
+        </p:nvSpPr>
+        <p:spPr>
+          <a:xfrm>
+            <a:off x="6934200" y="4629150"/>
+            <a:ext cx="1753154" cy="369332"/>
+          </a:xfrm>
+          <a:prstGeom prst="rect">
+            <a:avLst/>
+          </a:prstGeom>
+          <a:noFill/>
+        </p:spPr>
+        <p:txBody>
+          <a:bodyPr wrap="none" rtlCol="0">
+            <a:spAutoFit/>
+          </a:bodyPr>
+          <a:lstStyle/>
+          <a:p>
+            <a:r>
+              <a:rPr lang="en-US" dirty="0" smtClean="0"/>
+              <a:t>External Services</a:t>
+            </a:r>
+            <a:endParaRPr lang="en-US" dirty="0"/>
           </a:p>
         </p:txBody>
       </p:sp>
@@ -4919,7 +5170,7 @@
   <p:timing>
     <p:tnLst>
       <p:par>
-        <p:cTn id="1" dur="indefinite" restart="never" nodeType="tmRoot"/>
+        <p:cTn xmlns:p14="http://schemas.microsoft.com/office/powerpoint/2010/main" id="1" dur="indefinite" restart="never" nodeType="tmRoot"/>
       </p:par>
     </p:tnLst>
   </p:timing>
@@ -5163,26 +5414,18 @@
               <a:t>Learned web tools (</a:t>
             </a:r>
             <a:r>
-              <a:rPr lang="en-US" dirty="0" err="1" smtClean="0"/>
-              <a:t>django</a:t>
+              <a:rPr lang="en-US" dirty="0"/>
+              <a:t>D</a:t>
             </a:r>
             <a:r>
               <a:rPr lang="en-US" dirty="0" smtClean="0"/>
-              <a:t>)</a:t>
+              <a:t>jango)</a:t>
             </a:r>
           </a:p>
           <a:p>
             <a:r>
               <a:rPr lang="en-US" dirty="0" smtClean="0"/>
-              <a:t>Studied </a:t>
-            </a:r>
-            <a:r>
-              <a:rPr lang="en-US" dirty="0" err="1" smtClean="0"/>
-              <a:t>HaaS</a:t>
-            </a:r>
-            <a:r>
-              <a:rPr lang="en-US" dirty="0" smtClean="0"/>
-              <a:t> API</a:t>
+              <a:t>Studied HaaS API</a:t>
             </a:r>
           </a:p>
           <a:p>
@@ -5194,7 +5437,7 @@
           <a:p>
             <a:r>
               <a:rPr lang="en-US" dirty="0" smtClean="0"/>
-              <a:t>Did not use Trello</a:t>
+              <a:t>Did not use Trello properly</a:t>
             </a:r>
           </a:p>
           <a:p>
@@ -5240,7 +5483,7 @@
   <p:timing>
     <p:tnLst>
       <p:par>
-        <p:cTn id="1" dur="indefinite" restart="never" nodeType="tmRoot"/>
+        <p:cTn xmlns:p14="http://schemas.microsoft.com/office/powerpoint/2010/main" id="1" dur="indefinite" restart="never" nodeType="tmRoot"/>
       </p:par>
     </p:tnLst>
   </p:timing>
@@ -5276,12 +5519,14 @@
         </p:nvSpPr>
         <p:spPr/>
         <p:txBody>
-          <a:bodyPr/>
+          <a:bodyPr>
+            <a:normAutofit fontScale="90000"/>
+          </a:bodyPr>
           <a:lstStyle/>
           <a:p>
             <a:r>
               <a:rPr lang="en-US" dirty="0" smtClean="0"/>
-              <a:t>Sprint 2</a:t>
+              <a:t>Sprint 2 (will change depending on Igibek)</a:t>
             </a:r>
             <a:endParaRPr lang="en-US" dirty="0"/>
           </a:p>
@@ -5327,38 +5572,14 @@
                   <a:prstClr val="black"/>
                 </a:solidFill>
               </a:rPr>
-              <a:t>instances of </a:t>
-            </a:r>
-            <a:r>
-              <a:rPr lang="en-US" dirty="0" err="1" smtClean="0">
-                <a:solidFill>
-                  <a:prstClr val="black"/>
-                </a:solidFill>
-              </a:rPr>
-              <a:t>HaaS</a:t>
-            </a:r>
-            <a:r>
-              <a:rPr lang="en-US" dirty="0" smtClean="0">
-                <a:solidFill>
-                  <a:prstClr val="black"/>
-                </a:solidFill>
-              </a:rPr>
-              <a:t> server [3]</a:t>
+              <a:t>instances of HaaS server [3]</a:t>
             </a:r>
             <a:endParaRPr lang="en-US" dirty="0" smtClean="0"/>
           </a:p>
           <a:p>
             <a:r>
               <a:rPr lang="en-US" dirty="0" smtClean="0"/>
-              <a:t>Integrated </a:t>
-            </a:r>
-            <a:r>
-              <a:rPr lang="en-US" dirty="0" err="1" smtClean="0"/>
-              <a:t>HaaS</a:t>
-            </a:r>
-            <a:r>
-              <a:rPr lang="en-US" dirty="0" smtClean="0"/>
-              <a:t> API calls into web app</a:t>
+              <a:t>Integrated HaaS API calls into web app</a:t>
             </a:r>
           </a:p>
           <a:p>
@@ -5424,15 +5645,7 @@
           <a:p>
             <a:r>
               <a:rPr lang="en-US" dirty="0"/>
-              <a:t>Stretch – added API call to </a:t>
-            </a:r>
-            <a:r>
-              <a:rPr lang="en-US" dirty="0" err="1"/>
-              <a:t>HaaS</a:t>
-            </a:r>
-            <a:r>
-              <a:rPr lang="en-US" dirty="0"/>
-              <a:t> </a:t>
+              <a:t>Stretch – added API call to HaaS </a:t>
             </a:r>
             <a:endParaRPr lang="en-US" dirty="0" smtClean="0">
               <a:solidFill>
@@ -5461,7 +5674,7 @@
   <p:timing>
     <p:tnLst>
       <p:par>
-        <p:cTn id="1" dur="indefinite" restart="never" nodeType="tmRoot"/>
+        <p:cTn xmlns:p14="http://schemas.microsoft.com/office/powerpoint/2010/main" id="1" dur="indefinite" restart="never" nodeType="tmRoot"/>
       </p:par>
     </p:tnLst>
   </p:timing>
@@ -5501,12 +5714,8 @@
           <a:lstStyle/>
           <a:p>
             <a:r>
-              <a:rPr lang="en-US" dirty="0" err="1" smtClean="0"/>
-              <a:t>Burndown</a:t>
-            </a:r>
-            <a:r>
               <a:rPr lang="en-US" dirty="0" smtClean="0"/>
-              <a:t> – Bad Chart</a:t>
+              <a:t>Burndown – Bad Chart</a:t>
             </a:r>
             <a:endParaRPr lang="en-US" dirty="0"/>
           </a:p>
@@ -5546,14 +5755,14 @@
             <a:noFill/>
           </a:ln>
           <a:extLst>
-            <a:ext uri="{909E8E84-426E-40DD-AFC4-6F175D3DCCD1}">
+            <a:ext uri="{909E8E84-426E-40dd-AFC4-6F175D3DCCD1}">
               <a14:hiddenFill xmlns:a14="http://schemas.microsoft.com/office/drawing/2010/main">
                 <a:solidFill>
                   <a:schemeClr val="accent1"/>
                 </a:solidFill>
               </a14:hiddenFill>
             </a:ext>
-            <a:ext uri="{91240B29-F687-4F45-9708-019B960494DF}">
+            <a:ext uri="{91240B29-F687-4f45-9708-019B960494DF}">
               <a14:hiddenLine xmlns:a14="http://schemas.microsoft.com/office/drawing/2010/main" w="9525">
                 <a:solidFill>
                   <a:schemeClr val="tx1"/>
@@ -5612,12 +5821,8 @@
           <a:lstStyle/>
           <a:p>
             <a:r>
-              <a:rPr lang="en-US" dirty="0" err="1" smtClean="0"/>
-              <a:t>Burndown</a:t>
-            </a:r>
-            <a:r>
               <a:rPr lang="en-US" dirty="0" smtClean="0"/>
-              <a:t> – Corrected </a:t>
+              <a:t>Burndown – Corrected </a:t>
             </a:r>
             <a:endParaRPr lang="en-US" dirty="0"/>
           </a:p>
@@ -5657,14 +5862,14 @@
             <a:noFill/>
           </a:ln>
           <a:extLst>
-            <a:ext uri="{909E8E84-426E-40DD-AFC4-6F175D3DCCD1}">
+            <a:ext uri="{909E8E84-426E-40dd-AFC4-6F175D3DCCD1}">
               <a14:hiddenFill xmlns:a14="http://schemas.microsoft.com/office/drawing/2010/main">
                 <a:solidFill>
                   <a:schemeClr val="accent1"/>
                 </a:solidFill>
               </a14:hiddenFill>
             </a:ext>
-            <a:ext uri="{91240B29-F687-4F45-9708-019B960494DF}">
+            <a:ext uri="{91240B29-F687-4f45-9708-019B960494DF}">
               <a14:hiddenLine xmlns:a14="http://schemas.microsoft.com/office/drawing/2010/main" w="9525">
                 <a:solidFill>
                   <a:schemeClr val="tx1"/>
@@ -5690,7 +5895,7 @@
   <p:timing>
     <p:tnLst>
       <p:par>
-        <p:cTn id="1" dur="indefinite" restart="never" nodeType="tmRoot"/>
+        <p:cTn xmlns:p14="http://schemas.microsoft.com/office/powerpoint/2010/main" id="1" dur="indefinite" restart="never" nodeType="tmRoot"/>
       </p:par>
     </p:tnLst>
   </p:timing>
@@ -5764,23 +5969,14 @@
             </a:r>
             <a:r>
               <a:rPr lang="en-US" dirty="0" smtClean="0"/>
-              <a:t>) Integrate </a:t>
-            </a:r>
+              <a:t>) Integrate API calls</a:t>
+            </a:r>
+          </a:p>
+          <a:p>
             <a:r>
               <a:rPr lang="en-US" dirty="0" smtClean="0"/>
-              <a:t>API </a:t>
-            </a:r>
-            <a:r>
-              <a:rPr lang="en-US" dirty="0" smtClean="0"/>
-              <a:t>calls</a:t>
-            </a:r>
-          </a:p>
-          <a:p>
-            <a:r>
-              <a:rPr lang="en-US" dirty="0" smtClean="0"/>
-              <a:t>(?)Complete Submission Forms</a:t>
-            </a:r>
-            <a:endParaRPr lang="en-US" dirty="0" smtClean="0"/>
+              <a:t>(?) Complete Submission Forms</a:t>
+            </a:r>
           </a:p>
         </p:txBody>
       </p:sp>
@@ -5797,7 +5993,7 @@
   <p:timing>
     <p:tnLst>
       <p:par>
-        <p:cTn id="1" dur="indefinite" restart="never" nodeType="tmRoot"/>
+        <p:cTn xmlns:p14="http://schemas.microsoft.com/office/powerpoint/2010/main" id="1" dur="indefinite" restart="never" nodeType="tmRoot"/>
       </p:par>
     </p:tnLst>
   </p:timing>
@@ -5866,12 +6062,8 @@
           </a:p>
           <a:p>
             <a:r>
-              <a:rPr lang="en-US" dirty="0" err="1" smtClean="0"/>
-              <a:t>iFrame</a:t>
-            </a:r>
-            <a:r>
               <a:rPr lang="en-US" dirty="0" smtClean="0"/>
-              <a:t> Integration (Sprint 4 &amp; 5)</a:t>
+              <a:t>iFrame Integration (Sprint 4 &amp; 5)</a:t>
             </a:r>
           </a:p>
           <a:p>
@@ -5891,13 +6083,8 @@
             <a:pPr lvl="1"/>
             <a:r>
               <a:rPr lang="en-US" dirty="0" smtClean="0"/>
-              <a:t>Authorization for </a:t>
-            </a:r>
-            <a:r>
-              <a:rPr lang="en-US" dirty="0" err="1" smtClean="0"/>
-              <a:t>HaaS</a:t>
-            </a:r>
-            <a:endParaRPr lang="en-US" dirty="0" smtClean="0"/>
+              <a:t>Authorization for HaaS</a:t>
+            </a:r>
           </a:p>
         </p:txBody>
       </p:sp>

</xml_diff>

<commit_message>
modified sprint 2 slide
</commit_message>
<xml_diff>
--- a/MOCUIPlugin-Demo2.pptx
+++ b/MOCUIPlugin-Demo2.pptx
@@ -116,7 +116,7 @@
   </p:defaultTextStyle>
   <p:extLst>
     <p:ext uri="{EFAFB233-063F-42B5-8137-9DF3F51BA10A}">
-      <p15:sldGuideLst xmlns:p15="http://schemas.microsoft.com/office/powerpoint/2012/main" xmlns="">
+      <p15:sldGuideLst xmlns="" xmlns:p15="http://schemas.microsoft.com/office/powerpoint/2012/main">
         <p15:guide id="1" orient="horz" pos="1620">
           <p15:clr>
             <a:srgbClr val="A4A3A4"/>
@@ -218,7 +218,7 @@
             <a:fld id="{A8ADFD5B-A66C-449C-B6E8-FB716D07777D}" type="datetimeFigureOut">
               <a:rPr lang="en-US" smtClean="0"/>
               <a:pPr/>
-              <a:t>3/25/15</a:t>
+              <a:t>3/26/2015</a:t>
             </a:fld>
             <a:endParaRPr lang="en-US"/>
           </a:p>
@@ -858,7 +858,7 @@
                 </a:solidFill>
               </a:rPr>
               <a:pPr algn="ctr"/>
-              <a:t>3/25/15</a:t>
+              <a:t>3/26/2015</a:t>
             </a:fld>
             <a:endParaRPr kumimoji="0" lang="en-US" sz="2000" dirty="0">
               <a:solidFill>
@@ -1057,7 +1057,7 @@
             <a:fld id="{E4606EA6-EFEA-4C30-9264-4F9291A5780D}" type="datetime1">
               <a:rPr kumimoji="0" lang="en-US" smtClean="0"/>
               <a:pPr/>
-              <a:t>3/25/15</a:t>
+              <a:t>3/26/2015</a:t>
             </a:fld>
             <a:endParaRPr kumimoji="0" lang="en-US"/>
           </a:p>
@@ -1488,7 +1488,7 @@
             <a:fld id="{6FCF9F07-3BC7-4570-B054-79111B0A380C}" type="datetime1">
               <a:rPr kumimoji="0" lang="en-US" smtClean="0"/>
               <a:pPr/>
-              <a:t>3/25/15</a:t>
+              <a:t>3/26/2015</a:t>
             </a:fld>
             <a:endParaRPr kumimoji="0" lang="en-US"/>
           </a:p>
@@ -1753,7 +1753,7 @@
             <a:fld id="{E4606EA6-EFEA-4C30-9264-4F9291A5780D}" type="datetime1">
               <a:rPr kumimoji="0" lang="en-US" smtClean="0"/>
               <a:pPr/>
-              <a:t>3/25/15</a:t>
+              <a:t>3/26/2015</a:t>
             </a:fld>
             <a:endParaRPr kumimoji="0" lang="en-US"/>
           </a:p>
@@ -2008,7 +2008,7 @@
             <a:fld id="{E4606EA6-EFEA-4C30-9264-4F9291A5780D}" type="datetime1">
               <a:rPr kumimoji="0" lang="en-US" smtClean="0"/>
               <a:pPr/>
-              <a:t>3/25/15</a:t>
+              <a:t>3/26/2015</a:t>
             </a:fld>
             <a:endParaRPr kumimoji="0" lang="en-US"/>
           </a:p>
@@ -2221,7 +2221,7 @@
             <a:fld id="{6DFADB5D-B7A0-47E3-AD2D-B1A6F8614213}" type="datetime1">
               <a:rPr kumimoji="0" lang="en-US" smtClean="0"/>
               <a:pPr/>
-              <a:t>3/25/15</a:t>
+              <a:t>3/26/2015</a:t>
             </a:fld>
             <a:endParaRPr kumimoji="0" lang="en-US"/>
           </a:p>
@@ -2334,7 +2334,7 @@
             <a:fld id="{72968126-03FC-49C0-B9B8-2B561CCC3D90}" type="datetime1">
               <a:rPr kumimoji="0" lang="en-US" smtClean="0"/>
               <a:pPr/>
-              <a:t>3/25/15</a:t>
+              <a:t>3/26/2015</a:t>
             </a:fld>
             <a:endParaRPr kumimoji="0" lang="en-US"/>
           </a:p>
@@ -2487,7 +2487,7 @@
             <a:fld id="{F49A8198-4617-485E-9585-4840B69DBBA6}" type="datetime1">
               <a:rPr kumimoji="0" lang="en-US" smtClean="0"/>
               <a:pPr/>
-              <a:t>3/25/15</a:t>
+              <a:t>3/26/2015</a:t>
             </a:fld>
             <a:endParaRPr kumimoji="0" lang="en-US"/>
           </a:p>
@@ -3076,7 +3076,7 @@
             <a:fld id="{E4606EA6-EFEA-4C30-9264-4F9291A5780D}" type="datetime1">
               <a:rPr kumimoji="0" lang="en-US" smtClean="0"/>
               <a:pPr/>
-              <a:t>3/25/15</a:t>
+              <a:t>3/26/2015</a:t>
             </a:fld>
             <a:endParaRPr kumimoji="0" lang="en-US"/>
           </a:p>
@@ -3276,7 +3276,7 @@
             <a:fld id="{E4606EA6-EFEA-4C30-9264-4F9291A5780D}" type="datetime1">
               <a:rPr kumimoji="0" lang="en-US" smtClean="0"/>
               <a:pPr/>
-              <a:t>3/25/15</a:t>
+              <a:t>3/26/2015</a:t>
             </a:fld>
             <a:endParaRPr kumimoji="0" lang="en-US" sz="1400" dirty="0">
               <a:solidFill>
@@ -4303,7 +4303,7 @@
   <p:timing>
     <p:tnLst>
       <p:par>
-        <p:cTn xmlns:p14="http://schemas.microsoft.com/office/powerpoint/2010/main" id="1" dur="indefinite" restart="never" nodeType="tmRoot"/>
+        <p:cTn id="1" dur="indefinite" restart="never" nodeType="tmRoot"/>
       </p:par>
     </p:tnLst>
   </p:timing>
@@ -4368,7 +4368,7 @@
   <p:timing>
     <p:tnLst>
       <p:par>
-        <p:cTn xmlns:p14="http://schemas.microsoft.com/office/powerpoint/2010/main" id="1" dur="indefinite" restart="never" nodeType="tmRoot"/>
+        <p:cTn id="1" dur="indefinite" restart="never" nodeType="tmRoot"/>
       </p:par>
     </p:tnLst>
   </p:timing>
@@ -4499,7 +4499,7 @@
   <p:timing>
     <p:tnLst>
       <p:par>
-        <p:cTn xmlns:p14="http://schemas.microsoft.com/office/powerpoint/2010/main" id="1" dur="indefinite" restart="never" nodeType="tmRoot"/>
+        <p:cTn id="1" dur="indefinite" restart="never" nodeType="tmRoot"/>
       </p:par>
     </p:tnLst>
   </p:timing>
@@ -4523,6 +4523,47 @@
           <a:chExt cx="0" cy="0"/>
         </a:xfrm>
       </p:grpSpPr>
+      <p:pic>
+        <p:nvPicPr>
+          <p:cNvPr id="1026" name="Picture 2" descr="C:\Users\Dana\Desktop\moc-gui-plugins\haasplugin\static\images\light_blue_clouds.jpg"/>
+          <p:cNvPicPr>
+            <a:picLocks noChangeAspect="1" noChangeArrowheads="1"/>
+          </p:cNvPicPr>
+          <p:nvPr/>
+        </p:nvPicPr>
+        <p:blipFill>
+          <a:blip r:embed="rId2" cstate="print">
+            <a:extLst>
+              <a:ext uri="{28A0092B-C50C-407E-A947-70E740481C1C}">
+                <a14:useLocalDpi xmlns:a14="http://schemas.microsoft.com/office/drawing/2010/main" val="0"/>
+              </a:ext>
+            </a:extLst>
+          </a:blip>
+          <a:srcRect/>
+          <a:stretch>
+            <a:fillRect/>
+          </a:stretch>
+        </p:blipFill>
+        <p:spPr bwMode="auto">
+          <a:xfrm>
+            <a:off x="1981200" y="3028949"/>
+            <a:ext cx="1905000" cy="609601"/>
+          </a:xfrm>
+          <a:prstGeom prst="rect">
+            <a:avLst/>
+          </a:prstGeom>
+          <a:noFill/>
+          <a:extLst>
+            <a:ext uri="{909E8E84-426E-40DD-AFC4-6F175D3DCCD1}">
+              <a14:hiddenFill xmlns:a14="http://schemas.microsoft.com/office/drawing/2010/main">
+                <a:solidFill>
+                  <a:srgbClr val="FFFFFF"/>
+                </a:solidFill>
+              </a14:hiddenFill>
+            </a:ext>
+          </a:extLst>
+        </p:spPr>
+      </p:pic>
       <p:sp>
         <p:nvSpPr>
           <p:cNvPr id="2" name="Title 1"/>
@@ -4595,18 +4636,13 @@
         </p:nvSpPr>
         <p:spPr>
           <a:xfrm>
-            <a:off x="2057400" y="3028950"/>
+            <a:off x="1981200" y="3028950"/>
             <a:ext cx="1905000" cy="609600"/>
           </a:xfrm>
           <a:prstGeom prst="rect">
             <a:avLst/>
           </a:prstGeom>
-          <a:solidFill>
-            <a:schemeClr val="accent5">
-              <a:lumMod val="40000"/>
-              <a:lumOff val="60000"/>
-            </a:schemeClr>
-          </a:solidFill>
+          <a:noFill/>
         </p:spPr>
         <p:style>
           <a:lnRef idx="2">
@@ -4630,50 +4666,18 @@
           <a:p>
             <a:pPr algn="ctr"/>
             <a:r>
-              <a:rPr lang="en-US" dirty="0" smtClean="0"/>
+              <a:rPr lang="en-US" dirty="0" smtClean="0">
+                <a:solidFill>
+                  <a:schemeClr val="tx1"/>
+                </a:solidFill>
+              </a:rPr>
               <a:t>iFrame</a:t>
             </a:r>
-            <a:endParaRPr lang="en-US" dirty="0"/>
-          </a:p>
-        </p:txBody>
-      </p:sp>
-      <p:sp>
-        <p:nvSpPr>
-          <p:cNvPr id="5" name="Flowchart: Magnetic Disk 4"/>
-          <p:cNvSpPr/>
-          <p:nvPr/>
-        </p:nvSpPr>
-        <p:spPr>
-          <a:xfrm>
-            <a:off x="6781800" y="2419350"/>
-            <a:ext cx="1752600" cy="1600200"/>
-          </a:xfrm>
-          <a:prstGeom prst="flowChartMagneticDisk">
-            <a:avLst/>
-          </a:prstGeom>
-        </p:spPr>
-        <p:style>
-          <a:lnRef idx="2">
-            <a:schemeClr val="accent1">
-              <a:shade val="50000"/>
-            </a:schemeClr>
-          </a:lnRef>
-          <a:fillRef idx="1">
-            <a:schemeClr val="accent1"/>
-          </a:fillRef>
-          <a:effectRef idx="0">
-            <a:schemeClr val="accent1"/>
-          </a:effectRef>
-          <a:fontRef idx="minor">
-            <a:schemeClr val="lt1"/>
-          </a:fontRef>
-        </p:style>
-        <p:txBody>
-          <a:bodyPr rtlCol="0" anchor="ctr"/>
-          <a:lstStyle/>
-          <a:p>
-            <a:pPr algn="ctr"/>
-            <a:endParaRPr lang="en-US"/>
+            <a:endParaRPr lang="en-US" dirty="0">
+              <a:solidFill>
+                <a:schemeClr val="tx1"/>
+              </a:solidFill>
+            </a:endParaRPr>
           </a:p>
         </p:txBody>
       </p:sp>
@@ -4685,8 +4689,8 @@
         </p:nvCxnSpPr>
         <p:spPr>
           <a:xfrm>
-            <a:off x="3962400" y="3105150"/>
-            <a:ext cx="2590800" cy="0"/>
+            <a:off x="3886200" y="3105150"/>
+            <a:ext cx="2667000" cy="0"/>
           </a:xfrm>
           <a:prstGeom prst="straightConnector1">
             <a:avLst/>
@@ -4718,8 +4722,8 @@
         </p:nvCxnSpPr>
         <p:spPr>
           <a:xfrm flipH="1">
-            <a:off x="3962400" y="3486150"/>
-            <a:ext cx="2514600" cy="0"/>
+            <a:off x="3886200" y="3486150"/>
+            <a:ext cx="2677869" cy="0"/>
           </a:xfrm>
           <a:prstGeom prst="straightConnector1">
             <a:avLst/>
@@ -4878,6 +4882,11 @@
           <a:prstGeom prst="cube">
             <a:avLst/>
           </a:prstGeom>
+          <a:solidFill>
+            <a:schemeClr val="bg1">
+              <a:lumMod val="75000"/>
+            </a:schemeClr>
+          </a:solidFill>
         </p:spPr>
         <p:style>
           <a:lnRef idx="1">
@@ -5157,6 +5166,49 @@
           </a:p>
         </p:txBody>
       </p:sp>
+      <p:sp>
+        <p:nvSpPr>
+          <p:cNvPr id="22" name="Cube 21"/>
+          <p:cNvSpPr/>
+          <p:nvPr/>
+        </p:nvSpPr>
+        <p:spPr>
+          <a:xfrm>
+            <a:off x="6800849" y="2571750"/>
+            <a:ext cx="1533525" cy="1055132"/>
+          </a:xfrm>
+          <a:prstGeom prst="cube">
+            <a:avLst/>
+          </a:prstGeom>
+          <a:solidFill>
+            <a:schemeClr val="bg1">
+              <a:lumMod val="75000"/>
+            </a:schemeClr>
+          </a:solidFill>
+        </p:spPr>
+        <p:style>
+          <a:lnRef idx="1">
+            <a:schemeClr val="accent1"/>
+          </a:lnRef>
+          <a:fillRef idx="3">
+            <a:schemeClr val="accent1"/>
+          </a:fillRef>
+          <a:effectRef idx="2">
+            <a:schemeClr val="accent1"/>
+          </a:effectRef>
+          <a:fontRef idx="minor">
+            <a:schemeClr val="lt1"/>
+          </a:fontRef>
+        </p:style>
+        <p:txBody>
+          <a:bodyPr rtlCol="0" anchor="ctr"/>
+          <a:lstStyle/>
+          <a:p>
+            <a:pPr algn="ctr"/>
+            <a:endParaRPr lang="en-US"/>
+          </a:p>
+        </p:txBody>
+      </p:sp>
     </p:spTree>
     <p:extLst>
       <p:ext uri="{BB962C8B-B14F-4D97-AF65-F5344CB8AC3E}">
@@ -5170,7 +5222,7 @@
   <p:timing>
     <p:tnLst>
       <p:par>
-        <p:cTn xmlns:p14="http://schemas.microsoft.com/office/powerpoint/2010/main" id="1" dur="indefinite" restart="never" nodeType="tmRoot"/>
+        <p:cTn id="1" dur="indefinite" restart="never" nodeType="tmRoot"/>
       </p:par>
     </p:tnLst>
   </p:timing>
@@ -5483,7 +5535,7 @@
   <p:timing>
     <p:tnLst>
       <p:par>
-        <p:cTn xmlns:p14="http://schemas.microsoft.com/office/powerpoint/2010/main" id="1" dur="indefinite" restart="never" nodeType="tmRoot"/>
+        <p:cTn id="1" dur="indefinite" restart="never" nodeType="tmRoot"/>
       </p:par>
     </p:tnLst>
   </p:timing>
@@ -5520,13 +5572,17 @@
         <p:spPr/>
         <p:txBody>
           <a:bodyPr>
-            <a:normAutofit fontScale="90000"/>
+            <a:normAutofit/>
           </a:bodyPr>
           <a:lstStyle/>
           <a:p>
             <a:r>
               <a:rPr lang="en-US" dirty="0" smtClean="0"/>
-              <a:t>Sprint 2 (will change depending on Igibek)</a:t>
+              <a:t>Sprint </a:t>
+            </a:r>
+            <a:r>
+              <a:rPr lang="en-US" dirty="0" smtClean="0"/>
+              <a:t>2</a:t>
             </a:r>
             <a:endParaRPr lang="en-US" dirty="0"/>
           </a:p>
@@ -5545,7 +5601,7 @@
         <p:spPr/>
         <p:txBody>
           <a:bodyPr>
-            <a:normAutofit lnSpcReduction="10000"/>
+            <a:normAutofit/>
           </a:bodyPr>
           <a:lstStyle/>
           <a:p>
@@ -5590,17 +5646,6 @@
             </a:r>
           </a:p>
           <a:p>
-            <a:pPr lvl="1"/>
-            <a:r>
-              <a:rPr lang="en-US" dirty="0"/>
-              <a:t>(2) create/delete nodes  ??  [hours</a:t>
-            </a:r>
-            <a:r>
-              <a:rPr lang="en-US" dirty="0" smtClean="0"/>
-              <a:t>]</a:t>
-            </a:r>
-          </a:p>
-          <a:p>
             <a:r>
               <a:rPr lang="en-US" dirty="0" smtClean="0">
                 <a:solidFill>
@@ -5615,7 +5660,23 @@
                   <a:prstClr val="black"/>
                 </a:solidFill>
               </a:rPr>
-              <a:t>8) Finished UI (Django templates, CSS &amp; JavaScript</a:t>
+              <a:t>8) </a:t>
+            </a:r>
+            <a:r>
+              <a:rPr lang="en-US" dirty="0" smtClean="0">
+                <a:solidFill>
+                  <a:prstClr val="black"/>
+                </a:solidFill>
+              </a:rPr>
+              <a:t>Extended UI </a:t>
+            </a:r>
+            <a:r>
+              <a:rPr lang="en-US" dirty="0">
+                <a:solidFill>
+                  <a:prstClr val="black"/>
+                </a:solidFill>
+              </a:rPr>
+              <a:t>(Django templates, CSS &amp; JavaScript</a:t>
             </a:r>
             <a:r>
               <a:rPr lang="en-US" dirty="0" smtClean="0">
@@ -5641,17 +5702,6 @@
               </a:rPr>
               <a:t>]</a:t>
             </a:r>
-          </a:p>
-          <a:p>
-            <a:r>
-              <a:rPr lang="en-US" dirty="0"/>
-              <a:t>Stretch – added API call to HaaS </a:t>
-            </a:r>
-            <a:endParaRPr lang="en-US" dirty="0" smtClean="0">
-              <a:solidFill>
-                <a:prstClr val="black"/>
-              </a:solidFill>
-            </a:endParaRPr>
           </a:p>
           <a:p>
             <a:pPr marL="365760" lvl="1" indent="0">
@@ -5674,7 +5724,7 @@
   <p:timing>
     <p:tnLst>
       <p:par>
-        <p:cTn xmlns:p14="http://schemas.microsoft.com/office/powerpoint/2010/main" id="1" dur="indefinite" restart="never" nodeType="tmRoot"/>
+        <p:cTn id="1" dur="indefinite" restart="never" nodeType="tmRoot"/>
       </p:par>
     </p:tnLst>
   </p:timing>
@@ -5755,14 +5805,14 @@
             <a:noFill/>
           </a:ln>
           <a:extLst>
-            <a:ext uri="{909E8E84-426E-40dd-AFC4-6F175D3DCCD1}">
+            <a:ext uri="{909E8E84-426E-40DD-AFC4-6F175D3DCCD1}">
               <a14:hiddenFill xmlns:a14="http://schemas.microsoft.com/office/drawing/2010/main">
                 <a:solidFill>
                   <a:schemeClr val="accent1"/>
                 </a:solidFill>
               </a14:hiddenFill>
             </a:ext>
-            <a:ext uri="{91240B29-F687-4f45-9708-019B960494DF}">
+            <a:ext uri="{91240B29-F687-4F45-9708-019B960494DF}">
               <a14:hiddenLine xmlns:a14="http://schemas.microsoft.com/office/drawing/2010/main" w="9525">
                 <a:solidFill>
                   <a:schemeClr val="tx1"/>
@@ -5785,6 +5835,13 @@
   <p:clrMapOvr>
     <a:masterClrMapping/>
   </p:clrMapOvr>
+  <p:timing>
+    <p:tnLst>
+      <p:par>
+        <p:cTn id="1" dur="indefinite" restart="never" nodeType="tmRoot"/>
+      </p:par>
+    </p:tnLst>
+  </p:timing>
 </p:sld>
 </file>
 
@@ -5862,14 +5919,14 @@
             <a:noFill/>
           </a:ln>
           <a:extLst>
-            <a:ext uri="{909E8E84-426E-40dd-AFC4-6F175D3DCCD1}">
+            <a:ext uri="{909E8E84-426E-40DD-AFC4-6F175D3DCCD1}">
               <a14:hiddenFill xmlns:a14="http://schemas.microsoft.com/office/drawing/2010/main">
                 <a:solidFill>
                   <a:schemeClr val="accent1"/>
                 </a:solidFill>
               </a14:hiddenFill>
             </a:ext>
-            <a:ext uri="{91240B29-F687-4f45-9708-019B960494DF}">
+            <a:ext uri="{91240B29-F687-4F45-9708-019B960494DF}">
               <a14:hiddenLine xmlns:a14="http://schemas.microsoft.com/office/drawing/2010/main" w="9525">
                 <a:solidFill>
                   <a:schemeClr val="tx1"/>
@@ -5895,7 +5952,7 @@
   <p:timing>
     <p:tnLst>
       <p:par>
-        <p:cTn xmlns:p14="http://schemas.microsoft.com/office/powerpoint/2010/main" id="1" dur="indefinite" restart="never" nodeType="tmRoot"/>
+        <p:cTn id="1" dur="indefinite" restart="never" nodeType="tmRoot"/>
       </p:par>
     </p:tnLst>
   </p:timing>
@@ -5993,7 +6050,7 @@
   <p:timing>
     <p:tnLst>
       <p:par>
-        <p:cTn xmlns:p14="http://schemas.microsoft.com/office/powerpoint/2010/main" id="1" dur="indefinite" restart="never" nodeType="tmRoot"/>
+        <p:cTn id="1" dur="indefinite" restart="never" nodeType="tmRoot"/>
       </p:par>
     </p:tnLst>
   </p:timing>
@@ -6098,6 +6155,13 @@
   <p:clrMapOvr>
     <a:masterClrMapping/>
   </p:clrMapOvr>
+  <p:timing>
+    <p:tnLst>
+      <p:par>
+        <p:cTn id="1" dur="indefinite" restart="never" nodeType="tmRoot"/>
+      </p:par>
+    </p:tnLst>
+  </p:timing>
 </p:sld>
 </file>
 

</xml_diff>